<commit_message>
:lipstick: New icons were created.
</commit_message>
<xml_diff>
--- a/docs/description.pptx
+++ b/docs/description.pptx
@@ -106,6 +106,11 @@
       </a:defRPr>
     </a:lvl9pPr>
   </p:defaultTextStyle>
+  <p:extLst>
+    <p:ext uri="{EFAFB233-063F-42B5-8137-9DF3F51BA10A}">
+      <p15:sldGuideLst xmlns:p15="http://schemas.microsoft.com/office/powerpoint/2012/main"/>
+    </p:ext>
+  </p:extLst>
 </p:presentation>
 </file>
 
@@ -256,7 +261,7 @@
           <a:p>
             <a:fld id="{C469A8E0-141A-4DA4-8589-326FBB11F050}" type="datetimeFigureOut">
               <a:rPr kumimoji="1" lang="ja-JP" altLang="en-US" smtClean="0"/>
-              <a:t>2024/2/26</a:t>
+              <a:t>2024/2/27</a:t>
             </a:fld>
             <a:endParaRPr kumimoji="1" lang="ja-JP" altLang="en-US"/>
           </a:p>
@@ -486,7 +491,7 @@
           <a:p>
             <a:fld id="{C469A8E0-141A-4DA4-8589-326FBB11F050}" type="datetimeFigureOut">
               <a:rPr kumimoji="1" lang="ja-JP" altLang="en-US" smtClean="0"/>
-              <a:t>2024/2/26</a:t>
+              <a:t>2024/2/27</a:t>
             </a:fld>
             <a:endParaRPr kumimoji="1" lang="ja-JP" altLang="en-US"/>
           </a:p>
@@ -726,7 +731,7 @@
           <a:p>
             <a:fld id="{C469A8E0-141A-4DA4-8589-326FBB11F050}" type="datetimeFigureOut">
               <a:rPr kumimoji="1" lang="ja-JP" altLang="en-US" smtClean="0"/>
-              <a:t>2024/2/26</a:t>
+              <a:t>2024/2/27</a:t>
             </a:fld>
             <a:endParaRPr kumimoji="1" lang="ja-JP" altLang="en-US"/>
           </a:p>
@@ -956,7 +961,7 @@
           <a:p>
             <a:fld id="{C469A8E0-141A-4DA4-8589-326FBB11F050}" type="datetimeFigureOut">
               <a:rPr kumimoji="1" lang="ja-JP" altLang="en-US" smtClean="0"/>
-              <a:t>2024/2/26</a:t>
+              <a:t>2024/2/27</a:t>
             </a:fld>
             <a:endParaRPr kumimoji="1" lang="ja-JP" altLang="en-US"/>
           </a:p>
@@ -1231,7 +1236,7 @@
           <a:p>
             <a:fld id="{C469A8E0-141A-4DA4-8589-326FBB11F050}" type="datetimeFigureOut">
               <a:rPr kumimoji="1" lang="ja-JP" altLang="en-US" smtClean="0"/>
-              <a:t>2024/2/26</a:t>
+              <a:t>2024/2/27</a:t>
             </a:fld>
             <a:endParaRPr kumimoji="1" lang="ja-JP" altLang="en-US"/>
           </a:p>
@@ -1560,7 +1565,7 @@
           <a:p>
             <a:fld id="{C469A8E0-141A-4DA4-8589-326FBB11F050}" type="datetimeFigureOut">
               <a:rPr kumimoji="1" lang="ja-JP" altLang="en-US" smtClean="0"/>
-              <a:t>2024/2/26</a:t>
+              <a:t>2024/2/27</a:t>
             </a:fld>
             <a:endParaRPr kumimoji="1" lang="ja-JP" altLang="en-US"/>
           </a:p>
@@ -2036,7 +2041,7 @@
           <a:p>
             <a:fld id="{C469A8E0-141A-4DA4-8589-326FBB11F050}" type="datetimeFigureOut">
               <a:rPr kumimoji="1" lang="ja-JP" altLang="en-US" smtClean="0"/>
-              <a:t>2024/2/26</a:t>
+              <a:t>2024/2/27</a:t>
             </a:fld>
             <a:endParaRPr kumimoji="1" lang="ja-JP" altLang="en-US"/>
           </a:p>
@@ -2177,7 +2182,7 @@
           <a:p>
             <a:fld id="{C469A8E0-141A-4DA4-8589-326FBB11F050}" type="datetimeFigureOut">
               <a:rPr kumimoji="1" lang="ja-JP" altLang="en-US" smtClean="0"/>
-              <a:t>2024/2/26</a:t>
+              <a:t>2024/2/27</a:t>
             </a:fld>
             <a:endParaRPr kumimoji="1" lang="ja-JP" altLang="en-US"/>
           </a:p>
@@ -2290,7 +2295,7 @@
           <a:p>
             <a:fld id="{C469A8E0-141A-4DA4-8589-326FBB11F050}" type="datetimeFigureOut">
               <a:rPr kumimoji="1" lang="ja-JP" altLang="en-US" smtClean="0"/>
-              <a:t>2024/2/26</a:t>
+              <a:t>2024/2/27</a:t>
             </a:fld>
             <a:endParaRPr kumimoji="1" lang="ja-JP" altLang="en-US"/>
           </a:p>
@@ -2633,7 +2638,7 @@
           <a:p>
             <a:fld id="{C469A8E0-141A-4DA4-8589-326FBB11F050}" type="datetimeFigureOut">
               <a:rPr kumimoji="1" lang="ja-JP" altLang="en-US" smtClean="0"/>
-              <a:t>2024/2/26</a:t>
+              <a:t>2024/2/27</a:t>
             </a:fld>
             <a:endParaRPr kumimoji="1" lang="ja-JP" altLang="en-US"/>
           </a:p>
@@ -2921,7 +2926,7 @@
           <a:p>
             <a:fld id="{C469A8E0-141A-4DA4-8589-326FBB11F050}" type="datetimeFigureOut">
               <a:rPr kumimoji="1" lang="ja-JP" altLang="en-US" smtClean="0"/>
-              <a:t>2024/2/26</a:t>
+              <a:t>2024/2/27</a:t>
             </a:fld>
             <a:endParaRPr kumimoji="1" lang="ja-JP" altLang="en-US"/>
           </a:p>
@@ -3194,7 +3199,7 @@
           <a:p>
             <a:fld id="{C469A8E0-141A-4DA4-8589-326FBB11F050}" type="datetimeFigureOut">
               <a:rPr kumimoji="1" lang="ja-JP" altLang="en-US" smtClean="0"/>
-              <a:t>2024/2/26</a:t>
+              <a:t>2024/2/27</a:t>
             </a:fld>
             <a:endParaRPr kumimoji="1" lang="ja-JP" altLang="en-US"/>
           </a:p>
@@ -3619,123 +3624,102 @@
           <a:chExt cx="0" cy="0"/>
         </a:xfrm>
       </p:grpSpPr>
-      <p:grpSp>
-        <p:nvGrpSpPr>
-          <p:cNvPr id="12" name="グループ化 11">
-            <a:extLst>
-              <a:ext uri="{FF2B5EF4-FFF2-40B4-BE49-F238E27FC236}">
-                <a16:creationId xmlns:a16="http://schemas.microsoft.com/office/drawing/2014/main" id="{D2A7DBD3-EC91-9F1A-11AD-A331D5517A79}"/>
-              </a:ext>
-            </a:extLst>
-          </p:cNvPr>
-          <p:cNvGrpSpPr/>
+      <p:pic>
+        <p:nvPicPr>
+          <p:cNvPr id="3" name="グラフィックス 2">
+            <a:extLst>
+              <a:ext uri="{FF2B5EF4-FFF2-40B4-BE49-F238E27FC236}">
+                <a16:creationId xmlns:a16="http://schemas.microsoft.com/office/drawing/2014/main" id="{D0F31599-EF3F-31ED-685B-1DDE766C9CD4}"/>
+              </a:ext>
+            </a:extLst>
+          </p:cNvPr>
+          <p:cNvPicPr>
+            <a:picLocks noChangeAspect="1"/>
+          </p:cNvPicPr>
           <p:nvPr/>
-        </p:nvGrpSpPr>
-        <p:grpSpPr>
+        </p:nvPicPr>
+        <p:blipFill>
+          <a:blip r:embed="rId2">
+            <a:extLst>
+              <a:ext uri="{28A0092B-C50C-407E-A947-70E740481C1C}">
+                <a14:useLocalDpi xmlns:a14="http://schemas.microsoft.com/office/drawing/2010/main" val="0"/>
+              </a:ext>
+              <a:ext uri="{96DAC541-7B7A-43D3-8B79-37D633B846F1}">
+                <asvg:svgBlip xmlns:asvg="http://schemas.microsoft.com/office/drawing/2016/SVG/main" r:embed="rId3"/>
+              </a:ext>
+            </a:extLst>
+          </a:blip>
+          <a:stretch>
+            <a:fillRect/>
+          </a:stretch>
+        </p:blipFill>
+        <p:spPr>
           <a:xfrm>
-            <a:off x="1008847" y="1843925"/>
-            <a:ext cx="10174307" cy="3932148"/>
-            <a:chOff x="716999" y="1843925"/>
-            <a:chExt cx="10174307" cy="3932148"/>
+            <a:off x="1008846" y="1836747"/>
+            <a:ext cx="3932148" cy="3932148"/>
           </a:xfrm>
-        </p:grpSpPr>
-        <p:pic>
-          <p:nvPicPr>
-            <p:cNvPr id="7" name="グラフィックス 6">
-              <a:extLst>
-                <a:ext uri="{FF2B5EF4-FFF2-40B4-BE49-F238E27FC236}">
-                  <a16:creationId xmlns:a16="http://schemas.microsoft.com/office/drawing/2014/main" id="{7EEF6406-0DAA-B8A5-E29B-9DF3148FBDCB}"/>
-                </a:ext>
-              </a:extLst>
-            </p:cNvPr>
-            <p:cNvPicPr>
-              <a:picLocks noChangeAspect="1"/>
-            </p:cNvPicPr>
-            <p:nvPr/>
-          </p:nvPicPr>
-          <p:blipFill>
-            <a:blip r:embed="rId2">
-              <a:extLst>
-                <a:ext uri="{28A0092B-C50C-407E-A947-70E740481C1C}">
-                  <a14:useLocalDpi xmlns:a14="http://schemas.microsoft.com/office/drawing/2010/main" val="0"/>
-                </a:ext>
-                <a:ext uri="{96DAC541-7B7A-43D3-8B79-37D633B846F1}">
-                  <asvg:svgBlip xmlns:asvg="http://schemas.microsoft.com/office/drawing/2016/SVG/main" r:embed="rId3"/>
-                </a:ext>
-              </a:extLst>
-            </a:blip>
-            <a:stretch>
-              <a:fillRect/>
-            </a:stretch>
-          </p:blipFill>
-          <p:spPr>
-            <a:xfrm>
-              <a:off x="716999" y="1843925"/>
-              <a:ext cx="3932148" cy="3932148"/>
-            </a:xfrm>
-            <a:prstGeom prst="rect">
-              <a:avLst/>
-            </a:prstGeom>
-          </p:spPr>
-        </p:pic>
-        <p:sp>
-          <p:nvSpPr>
-            <p:cNvPr id="11" name="テキスト ボックス 10">
-              <a:extLst>
-                <a:ext uri="{FF2B5EF4-FFF2-40B4-BE49-F238E27FC236}">
-                  <a16:creationId xmlns:a16="http://schemas.microsoft.com/office/drawing/2014/main" id="{BD297D0B-4447-93ED-D9B2-ED21B2F655D8}"/>
-                </a:ext>
-              </a:extLst>
-            </p:cNvPr>
-            <p:cNvSpPr txBox="1"/>
-            <p:nvPr/>
-          </p:nvSpPr>
-          <p:spPr>
-            <a:xfrm>
-              <a:off x="4917885" y="3055947"/>
-              <a:ext cx="5973421" cy="1508105"/>
-            </a:xfrm>
-            <a:prstGeom prst="rect">
-              <a:avLst/>
-            </a:prstGeom>
-            <a:noFill/>
-          </p:spPr>
-          <p:txBody>
-            <a:bodyPr wrap="square">
-              <a:spAutoFit/>
-            </a:bodyPr>
-            <a:lstStyle/>
-            <a:p>
-              <a:r>
-                <a:rPr lang="en-US" altLang="ja-JP" sz="4600" dirty="0">
-                  <a:solidFill>
-                    <a:srgbClr val="333333"/>
-                  </a:solidFill>
-                  <a:latin typeface="Arial Rounded MT Bold" panose="020F0704030504030204" pitchFamily="34" charset="0"/>
-                </a:rPr>
-                <a:t>Login to Salesforce</a:t>
-              </a:r>
-            </a:p>
-            <a:p>
-              <a:r>
-                <a:rPr lang="en-US" altLang="ja-JP" sz="4600" dirty="0">
-                  <a:solidFill>
-                    <a:srgbClr val="333333"/>
-                  </a:solidFill>
-                  <a:latin typeface="Arial Rounded MT Bold" panose="020F0704030504030204" pitchFamily="34" charset="0"/>
-                </a:rPr>
-                <a:t>by query strings</a:t>
-              </a:r>
-              <a:endParaRPr lang="ja-JP" altLang="en-US" sz="4600" dirty="0">
+          <a:prstGeom prst="rect">
+            <a:avLst/>
+          </a:prstGeom>
+        </p:spPr>
+      </p:pic>
+      <p:sp>
+        <p:nvSpPr>
+          <p:cNvPr id="11" name="テキスト ボックス 10">
+            <a:extLst>
+              <a:ext uri="{FF2B5EF4-FFF2-40B4-BE49-F238E27FC236}">
+                <a16:creationId xmlns:a16="http://schemas.microsoft.com/office/drawing/2014/main" id="{BD297D0B-4447-93ED-D9B2-ED21B2F655D8}"/>
+              </a:ext>
+            </a:extLst>
+          </p:cNvPr>
+          <p:cNvSpPr txBox="1"/>
+          <p:nvPr/>
+        </p:nvSpPr>
+        <p:spPr>
+          <a:xfrm>
+            <a:off x="5209733" y="3055947"/>
+            <a:ext cx="5973421" cy="1508105"/>
+          </a:xfrm>
+          <a:prstGeom prst="rect">
+            <a:avLst/>
+          </a:prstGeom>
+          <a:noFill/>
+        </p:spPr>
+        <p:txBody>
+          <a:bodyPr wrap="square">
+            <a:spAutoFit/>
+          </a:bodyPr>
+          <a:lstStyle/>
+          <a:p>
+            <a:r>
+              <a:rPr lang="en-US" altLang="ja-JP" sz="4600" dirty="0">
                 <a:solidFill>
                   <a:srgbClr val="333333"/>
                 </a:solidFill>
                 <a:latin typeface="Arial Rounded MT Bold" panose="020F0704030504030204" pitchFamily="34" charset="0"/>
-              </a:endParaRPr>
-            </a:p>
-          </p:txBody>
-        </p:sp>
-      </p:grpSp>
+              </a:rPr>
+              <a:t>Login to Salesforce</a:t>
+            </a:r>
+          </a:p>
+          <a:p>
+            <a:r>
+              <a:rPr lang="en-US" altLang="ja-JP" sz="4600" dirty="0">
+                <a:solidFill>
+                  <a:srgbClr val="333333"/>
+                </a:solidFill>
+                <a:latin typeface="Arial Rounded MT Bold" panose="020F0704030504030204" pitchFamily="34" charset="0"/>
+              </a:rPr>
+              <a:t>by query strings</a:t>
+            </a:r>
+            <a:endParaRPr lang="ja-JP" altLang="en-US" sz="4600" dirty="0">
+              <a:solidFill>
+                <a:srgbClr val="333333"/>
+              </a:solidFill>
+              <a:latin typeface="Arial Rounded MT Bold" panose="020F0704030504030204" pitchFamily="34" charset="0"/>
+            </a:endParaRPr>
+          </a:p>
+        </p:txBody>
+      </p:sp>
     </p:spTree>
     <p:extLst>
       <p:ext uri="{BB962C8B-B14F-4D97-AF65-F5344CB8AC3E}">

</xml_diff>